<commit_message>
Tweaked session 12 slides.
</commit_message>
<xml_diff>
--- a/slides/session12.pptx
+++ b/slides/session12.pptx
@@ -12547,17 +12547,11 @@
           <a:p>
             <a:r>
               <a:rPr lang="en-US" dirty="0" smtClean="0"/>
-              <a:t>What’s already there?</a:t>
-            </a:r>
-          </a:p>
-          <a:p>
-            <a:r>
-              <a:rPr lang="en-US" dirty="0"/>
-              <a:t>What’s the use context</a:t>
+              <a:t>What’s </a:t>
             </a:r>
             <a:r>
               <a:rPr lang="en-US" dirty="0" smtClean="0"/>
-              <a:t>?</a:t>
+              <a:t>already there?</a:t>
             </a:r>
           </a:p>
           <a:p>
@@ -12574,10 +12568,13 @@
             </a:r>
           </a:p>
           <a:p>
+            <a:r>
+              <a:rPr lang="en-US" dirty="0"/>
+              <a:t>What’s the use context?</a:t>
+            </a:r>
+          </a:p>
+          <a:p>
             <a:endParaRPr lang="en-US" dirty="0" smtClean="0"/>
-          </a:p>
-          <a:p>
-            <a:endParaRPr lang="en-US" dirty="0"/>
           </a:p>
         </p:txBody>
       </p:sp>
@@ -15397,7 +15394,7 @@
           <p:nvPr>
             <p:extLst>
               <p:ext uri="{D42A27DB-BD31-4B8C-83A1-F6EECF244321}">
-                <p14:modId xmlns:p14="http://schemas.microsoft.com/office/powerpoint/2010/main" val="922125878"/>
+                <p14:modId xmlns:p14="http://schemas.microsoft.com/office/powerpoint/2010/main" val="150076990"/>
               </p:ext>
             </p:extLst>
           </p:nvPr>
@@ -15779,7 +15776,7 @@
                         <a:tabLst/>
                       </a:pPr>
                       <a:r>
-                        <a:rPr kumimoji="0" lang="en-US" sz="1800" b="0" i="0" u="none" strike="noStrike" cap="none" normalizeH="0" baseline="0" smtClean="0">
+                        <a:rPr kumimoji="0" lang="en-US" sz="1800" b="0" i="0" u="none" strike="noStrike" cap="none" normalizeH="0" baseline="0" dirty="0" smtClean="0">
                           <a:ln>
                             <a:noFill/>
                           </a:ln>
@@ -15790,7 +15787,7 @@
                           <a:latin typeface="Gill Sans"/>
                           <a:cs typeface="Gill Sans"/>
                         </a:rPr>
-                        <a:t>Windows XP</a:t>
+                        <a:t>Windows</a:t>
                       </a:r>
                     </a:p>
                   </a:txBody>

</xml_diff>